<commit_message>
Rajout Modification CH AP dans présentation Loops pour journée CDS
</commit_message>
<xml_diff>
--- a/presentations/PrésentationLoOPSAnglais.pptx
+++ b/presentations/PrésentationLoOPSAnglais.pptx
@@ -201,7 +201,7 @@
           <a:p>
             <a:fld id="{99734DAD-B8A5-CA4D-AB71-C93C2527309C}" type="datetimeFigureOut">
               <a:rPr lang="fr-FR" smtClean="0"/>
-              <a:t>19/10/15</a:t>
+              <a:t>20/10/15</a:t>
             </a:fld>
             <a:endParaRPr lang="fr-FR"/>
           </a:p>
@@ -367,7 +367,7 @@
           <a:p>
             <a:fld id="{D50D922F-5A0C-8640-8E2E-DF9344F4008A}" type="datetimeFigureOut">
               <a:rPr lang="fr-FR" smtClean="0"/>
-              <a:t>19/10/15</a:t>
+              <a:t>20/10/15</a:t>
             </a:fld>
             <a:endParaRPr lang="fr-FR"/>
           </a:p>
@@ -4376,7 +4376,7 @@
             </a:r>
             <a:r>
               <a:rPr lang="fr-FR" sz="2400" dirty="0" err="1" smtClean="0"/>
-              <a:t>its</a:t>
+              <a:t>his</a:t>
             </a:r>
             <a:r>
               <a:rPr lang="fr-FR" sz="2400" dirty="0" smtClean="0"/>
@@ -4441,7 +4441,40 @@
               <a:rPr lang="fr-FR" sz="2400" dirty="0" smtClean="0"/>
               <a:t>.</a:t>
             </a:r>
-            <a:endParaRPr lang="fr-FR" sz="2400" dirty="0"/>
+          </a:p>
+          <a:p>
+            <a:pPr marL="0" indent="0">
+              <a:buNone/>
+            </a:pPr>
+            <a:r>
+              <a:rPr lang="fr-FR" sz="2000" dirty="0" smtClean="0">
+                <a:solidFill>
+                  <a:srgbClr val="0000FF"/>
+                </a:solidFill>
+              </a:rPr>
+              <a:t>								http</a:t>
+            </a:r>
+            <a:r>
+              <a:rPr lang="fr-FR" sz="2000" dirty="0">
+                <a:solidFill>
+                  <a:srgbClr val="0000FF"/>
+                </a:solidFill>
+              </a:rPr>
+              <a:t>://</a:t>
+            </a:r>
+            <a:r>
+              <a:rPr lang="fr-FR" sz="2000" dirty="0" err="1">
+                <a:solidFill>
+                  <a:srgbClr val="0000FF"/>
+                </a:solidFill>
+              </a:rPr>
+              <a:t>devlog.cnrs.fr</a:t>
+            </a:r>
+            <a:endParaRPr lang="fr-FR" sz="2000" dirty="0">
+              <a:solidFill>
+                <a:srgbClr val="0000FF"/>
+              </a:solidFill>
+            </a:endParaRPr>
           </a:p>
         </p:txBody>
       </p:sp>
@@ -4614,6 +4647,36 @@
       </p:grpSpPr>
       <p:pic>
         <p:nvPicPr>
+          <p:cNvPr id="18" name="Image 17" descr="Tux_dev3.png"/>
+          <p:cNvPicPr>
+            <a:picLocks noChangeAspect="1"/>
+          </p:cNvPicPr>
+          <p:nvPr/>
+        </p:nvPicPr>
+        <p:blipFill>
+          <a:blip r:embed="rId2">
+            <a:extLst>
+              <a:ext uri="{28A0092B-C50C-407E-A947-70E740481C1C}">
+                <a14:useLocalDpi xmlns:a14="http://schemas.microsoft.com/office/drawing/2010/main" val="0"/>
+              </a:ext>
+            </a:extLst>
+          </a:blip>
+          <a:stretch>
+            <a:fillRect/>
+          </a:stretch>
+        </p:blipFill>
+        <p:spPr>
+          <a:xfrm>
+            <a:off x="7830751" y="822288"/>
+            <a:ext cx="1313249" cy="1097583"/>
+          </a:xfrm>
+          <a:prstGeom prst="rect">
+            <a:avLst/>
+          </a:prstGeom>
+        </p:spPr>
+      </p:pic>
+      <p:pic>
+        <p:nvPicPr>
           <p:cNvPr id="22" name="Image 21" descr="TuxDev1.tiff"/>
           <p:cNvPicPr>
             <a:picLocks noChangeAspect="1"/>
@@ -4621,7 +4684,7 @@
           <p:nvPr/>
         </p:nvPicPr>
         <p:blipFill>
-          <a:blip r:embed="rId2">
+          <a:blip r:embed="rId3">
             <a:extLst>
               <a:ext uri="{28A0092B-C50C-407E-A947-70E740481C1C}">
                 <a14:useLocalDpi xmlns:a14="http://schemas.microsoft.com/office/drawing/2010/main" val="0"/>
@@ -4734,7 +4797,53 @@
             </a:r>
             <a:r>
               <a:rPr lang="fr-FR" sz="2000" dirty="0" err="1" smtClean="0"/>
-              <a:t>with</a:t>
+              <a:t>involved</a:t>
+            </a:r>
+            <a:r>
+              <a:rPr lang="fr-FR" sz="2000" dirty="0" smtClean="0"/>
+              <a:t> in a </a:t>
+            </a:r>
+            <a:r>
+              <a:rPr lang="fr-FR" sz="2000" dirty="0" err="1" smtClean="0"/>
+              <a:t>development</a:t>
+            </a:r>
+            <a:r>
+              <a:rPr lang="fr-FR" sz="2000" dirty="0" smtClean="0"/>
+              <a:t> software </a:t>
+            </a:r>
+            <a:r>
+              <a:rPr lang="fr-FR" sz="2000" dirty="0" err="1" smtClean="0"/>
+              <a:t>activity</a:t>
+            </a:r>
+            <a:r>
+              <a:rPr lang="fr-FR" sz="2000" dirty="0" smtClean="0"/>
+              <a:t> :</a:t>
+            </a:r>
+            <a:endParaRPr lang="fr-FR" sz="2000" dirty="0"/>
+          </a:p>
+          <a:p>
+            <a:pPr marL="0" indent="0">
+              <a:buNone/>
+            </a:pPr>
+            <a:r>
+              <a:rPr lang="is-IS" sz="2000" dirty="0" smtClean="0"/>
+              <a:t>► </a:t>
+            </a:r>
+            <a:r>
+              <a:rPr lang="fr-FR" sz="2000" dirty="0" err="1"/>
+              <a:t>W</a:t>
+            </a:r>
+            <a:r>
+              <a:rPr lang="fr-FR" sz="2000" dirty="0" err="1" smtClean="0"/>
+              <a:t>hatever</a:t>
+            </a:r>
+            <a:r>
+              <a:rPr lang="fr-FR" sz="2000" dirty="0" smtClean="0"/>
+              <a:t> the </a:t>
+            </a:r>
+            <a:r>
+              <a:rPr lang="fr-FR" sz="2000" dirty="0" err="1" smtClean="0"/>
+              <a:t>working</a:t>
             </a:r>
             <a:r>
               <a:rPr lang="fr-FR" sz="2000" dirty="0" smtClean="0"/>
@@ -4742,21 +4851,60 @@
             </a:r>
             <a:r>
               <a:rPr lang="fr-FR" sz="2000" dirty="0" err="1" smtClean="0"/>
-              <a:t>development</a:t>
+              <a:t>category</a:t>
             </a:r>
             <a:r>
               <a:rPr lang="fr-FR" sz="2000" dirty="0" smtClean="0"/>
-              <a:t> software </a:t>
+              <a:t>: </a:t>
+            </a:r>
+            <a:r>
+              <a:rPr lang="fr-FR" sz="2000" dirty="0" err="1"/>
+              <a:t>e</a:t>
             </a:r>
             <a:r>
               <a:rPr lang="fr-FR" sz="2000" dirty="0" err="1" smtClean="0"/>
-              <a:t>activity</a:t>
+              <a:t>ngineer</a:t>
             </a:r>
             <a:r>
               <a:rPr lang="fr-FR" sz="2000" dirty="0" smtClean="0"/>
-              <a:t> :</a:t>
-            </a:r>
-            <a:endParaRPr lang="fr-FR" sz="2000" dirty="0"/>
+              <a:t>, </a:t>
+            </a:r>
+            <a:r>
+              <a:rPr lang="fr-FR" sz="2000" dirty="0" err="1" smtClean="0"/>
+              <a:t>technician</a:t>
+            </a:r>
+            <a:r>
+              <a:rPr lang="fr-FR" sz="2000" dirty="0" smtClean="0"/>
+              <a:t>, </a:t>
+            </a:r>
+            <a:r>
+              <a:rPr lang="fr-FR" sz="2000" dirty="0" err="1" smtClean="0"/>
+              <a:t>teacher</a:t>
+            </a:r>
+            <a:r>
+              <a:rPr lang="fr-FR" sz="2000" dirty="0" smtClean="0"/>
+              <a:t>, </a:t>
+            </a:r>
+            <a:r>
+              <a:rPr lang="fr-FR" sz="2000" dirty="0" err="1" smtClean="0"/>
+              <a:t>researcher</a:t>
+            </a:r>
+            <a:r>
+              <a:rPr lang="fr-FR" sz="2000" dirty="0" smtClean="0"/>
+              <a:t>, </a:t>
+            </a:r>
+            <a:r>
+              <a:rPr lang="fr-FR" sz="2000" dirty="0" err="1" smtClean="0"/>
+              <a:t>graduate</a:t>
+            </a:r>
+            <a:r>
+              <a:rPr lang="fr-FR" sz="2000" dirty="0" smtClean="0"/>
+              <a:t> </a:t>
+            </a:r>
+            <a:r>
+              <a:rPr lang="is-IS" sz="2000" dirty="0" smtClean="0"/>
+              <a:t>student.</a:t>
+            </a:r>
           </a:p>
           <a:p>
             <a:pPr marL="0" indent="0">
@@ -4767,97 +4915,12 @@
               <a:t>► </a:t>
             </a:r>
             <a:r>
-              <a:rPr lang="fr-FR" sz="2000" dirty="0" err="1"/>
-              <a:t>W</a:t>
-            </a:r>
-            <a:r>
-              <a:rPr lang="fr-FR" sz="2000" dirty="0" err="1" smtClean="0"/>
-              <a:t>hatever</a:t>
-            </a:r>
-            <a:r>
-              <a:rPr lang="fr-FR" sz="2000" dirty="0" smtClean="0"/>
-              <a:t> the </a:t>
-            </a:r>
-            <a:r>
-              <a:rPr lang="fr-FR" sz="2000" dirty="0" err="1" smtClean="0"/>
-              <a:t>working</a:t>
-            </a:r>
-            <a:r>
-              <a:rPr lang="fr-FR" sz="2000" dirty="0" smtClean="0"/>
-              <a:t> </a:t>
-            </a:r>
-            <a:r>
-              <a:rPr lang="fr-FR" sz="2000" dirty="0" err="1" smtClean="0"/>
-              <a:t>category</a:t>
-            </a:r>
-            <a:r>
-              <a:rPr lang="fr-FR" sz="2000" dirty="0" smtClean="0"/>
-              <a:t>: </a:t>
-            </a:r>
-            <a:r>
-              <a:rPr lang="fr-FR" sz="2000" dirty="0" err="1"/>
-              <a:t>e</a:t>
-            </a:r>
-            <a:r>
-              <a:rPr lang="fr-FR" sz="2000" dirty="0" err="1" smtClean="0"/>
-              <a:t>ngineer</a:t>
-            </a:r>
-            <a:r>
-              <a:rPr lang="fr-FR" sz="2000" dirty="0" smtClean="0"/>
-              <a:t>, </a:t>
-            </a:r>
-            <a:r>
-              <a:rPr lang="fr-FR" sz="2000" dirty="0" err="1" smtClean="0"/>
-              <a:t>technician</a:t>
-            </a:r>
-            <a:r>
-              <a:rPr lang="fr-FR" sz="2000" dirty="0" smtClean="0"/>
-              <a:t>, </a:t>
-            </a:r>
-            <a:r>
-              <a:rPr lang="fr-FR" sz="2000" dirty="0" err="1" smtClean="0"/>
-              <a:t>teacher</a:t>
-            </a:r>
-            <a:r>
-              <a:rPr lang="fr-FR" sz="2000" dirty="0" smtClean="0"/>
-              <a:t>, </a:t>
-            </a:r>
-            <a:r>
-              <a:rPr lang="fr-FR" sz="2000" dirty="0" err="1" smtClean="0"/>
-              <a:t>researcher</a:t>
-            </a:r>
-            <a:r>
-              <a:rPr lang="fr-FR" sz="2000" dirty="0" smtClean="0"/>
-              <a:t>, </a:t>
-            </a:r>
-            <a:r>
-              <a:rPr lang="fr-FR" sz="2000" dirty="0" err="1" smtClean="0"/>
-              <a:t>graduate</a:t>
-            </a:r>
-            <a:r>
-              <a:rPr lang="fr-FR" sz="2000" dirty="0" smtClean="0"/>
-              <a:t> </a:t>
-            </a:r>
-            <a:r>
-              <a:rPr lang="is-IS" sz="2000" dirty="0" smtClean="0"/>
-              <a:t>student.</a:t>
-            </a:r>
-          </a:p>
-          <a:p>
-            <a:pPr marL="0" indent="0">
-              <a:buNone/>
-            </a:pPr>
-            <a:r>
-              <a:rPr lang="is-IS" sz="2000" dirty="0" smtClean="0"/>
-              <a:t>► </a:t>
-            </a:r>
-            <a:r>
               <a:rPr lang="fr-FR" sz="2000" dirty="0" smtClean="0"/>
               <a:t>W</a:t>
             </a:r>
             <a:r>
               <a:rPr lang="is-IS" sz="2000" dirty="0" smtClean="0"/>
-              <a:t>hatever the position  : state employee, permanent contract, fixed term contract...</a:t>
+              <a:t>hatever the position: state employee, permanent contract, fixed term contract...</a:t>
             </a:r>
           </a:p>
           <a:p>
@@ -4866,7 +4929,7 @@
             </a:pPr>
             <a:r>
               <a:rPr lang="is-IS" sz="2000" dirty="0" smtClean="0"/>
-              <a:t>► Whatever the level : beginner, advanced, expert.</a:t>
+              <a:t>► Whatever the level: beginner, advanced, expert.</a:t>
             </a:r>
           </a:p>
           <a:p>
@@ -4875,7 +4938,7 @@
             </a:pPr>
             <a:r>
               <a:rPr lang="is-IS" sz="2000" dirty="0" smtClean="0"/>
-              <a:t>► Whatever the time spent on devlopping : full time, occasionally...</a:t>
+              <a:t>► Whatever the time spent on developing: full time, occasionally...</a:t>
             </a:r>
             <a:endParaRPr lang="fr-FR" sz="2000" dirty="0" smtClean="0"/>
           </a:p>
@@ -4890,7 +4953,7 @@
           <p:nvPr/>
         </p:nvPicPr>
         <p:blipFill>
-          <a:blip r:embed="rId3">
+          <a:blip r:embed="rId4">
             <a:extLst>
               <a:ext uri="{28A0092B-C50C-407E-A947-70E740481C1C}">
                 <a14:useLocalDpi xmlns:a14="http://schemas.microsoft.com/office/drawing/2010/main" val="0"/>
@@ -4920,7 +4983,7 @@
           <p:nvPr/>
         </p:nvPicPr>
         <p:blipFill>
-          <a:blip r:embed="rId4">
+          <a:blip r:embed="rId5">
             <a:extLst>
               <a:ext uri="{28A0092B-C50C-407E-A947-70E740481C1C}">
                 <a14:useLocalDpi xmlns:a14="http://schemas.microsoft.com/office/drawing/2010/main" val="0"/>
@@ -4941,36 +5004,6 @@
           </a:prstGeom>
         </p:spPr>
       </p:pic>
-      <p:pic>
-        <p:nvPicPr>
-          <p:cNvPr id="18" name="Image 17" descr="Tux_dev3.png"/>
-          <p:cNvPicPr>
-            <a:picLocks noChangeAspect="1"/>
-          </p:cNvPicPr>
-          <p:nvPr/>
-        </p:nvPicPr>
-        <p:blipFill>
-          <a:blip r:embed="rId5">
-            <a:extLst>
-              <a:ext uri="{28A0092B-C50C-407E-A947-70E740481C1C}">
-                <a14:useLocalDpi xmlns:a14="http://schemas.microsoft.com/office/drawing/2010/main" val="0"/>
-              </a:ext>
-            </a:extLst>
-          </a:blip>
-          <a:stretch>
-            <a:fillRect/>
-          </a:stretch>
-        </p:blipFill>
-        <p:spPr>
-          <a:xfrm>
-            <a:off x="7658791" y="822288"/>
-            <a:ext cx="1485209" cy="1241303"/>
-          </a:xfrm>
-          <a:prstGeom prst="rect">
-            <a:avLst/>
-          </a:prstGeom>
-        </p:spPr>
-      </p:pic>
       <p:sp>
         <p:nvSpPr>
           <p:cNvPr id="19" name="ZoneTexte 18"/>
@@ -5022,11 +5055,7 @@
             </a:r>
             <a:r>
               <a:rPr lang="fr-FR" dirty="0" smtClean="0"/>
-              <a:t> </a:t>
-            </a:r>
-            <a:r>
-              <a:rPr lang="fr-FR" dirty="0" smtClean="0"/>
-              <a:t>CNRS and INRIA in the </a:t>
+              <a:t> CNRS and INRIA in the </a:t>
             </a:r>
             <a:r>
               <a:rPr lang="fr-FR" dirty="0" err="1" smtClean="0"/>
@@ -5446,7 +5475,7 @@
             </a:r>
             <a:r>
               <a:rPr lang="fr-FR" dirty="0" err="1" smtClean="0"/>
-              <a:t>Loops</a:t>
+              <a:t>LoOPS</a:t>
             </a:r>
             <a:r>
               <a:rPr lang="fr-FR" dirty="0" smtClean="0"/>
@@ -5474,7 +5503,7 @@
             </a:r>
             <a:r>
               <a:rPr lang="fr-FR" dirty="0" smtClean="0"/>
-              <a:t>, workshops, </a:t>
+              <a:t>, hands-on sessions, </a:t>
             </a:r>
             <a:r>
               <a:rPr lang="fr-FR" dirty="0" err="1" smtClean="0"/>
@@ -5482,8 +5511,13 @@
             </a:r>
             <a:r>
               <a:rPr lang="fr-FR" dirty="0" smtClean="0"/>
-              <a:t>-dojo).</a:t>
-            </a:r>
+              <a:t>-dojos</a:t>
+            </a:r>
+            <a:r>
+              <a:rPr lang="fr-FR" dirty="0" smtClean="0"/>
+              <a:t>)</a:t>
+            </a:r>
+            <a:endParaRPr lang="fr-FR" dirty="0" smtClean="0"/>
           </a:p>
           <a:p>
             <a:pPr marL="457200" lvl="1" indent="0">
@@ -5510,7 +5544,9 @@
               <a:t>List 			</a:t>
             </a:r>
             <a:r>
-              <a:rPr lang="fr-FR" sz="2400" b="1" dirty="0" err="1" smtClean="0"/>
+              <a:rPr lang="fr-FR" sz="2400" b="1" dirty="0" err="1" smtClean="0">
+                <a:hlinkClick r:id="rId2"/>
+              </a:rPr>
               <a:t>loops@groupes.renater.fr</a:t>
             </a:r>
             <a:endParaRPr lang="fr-FR" sz="2400" dirty="0" smtClean="0">
@@ -5522,12 +5558,20 @@
           <a:p>
             <a:pPr lvl="2"/>
             <a:r>
+              <a:rPr lang="fr-FR" dirty="0">
+                <a:solidFill>
+                  <a:srgbClr val="000000"/>
+                </a:solidFill>
+              </a:rPr>
+              <a:t>T</a:t>
+            </a:r>
+            <a:r>
               <a:rPr lang="fr-FR" dirty="0" smtClean="0">
                 <a:solidFill>
                   <a:srgbClr val="000000"/>
                 </a:solidFill>
               </a:rPr>
-              <a:t>to </a:t>
+              <a:t>o </a:t>
             </a:r>
             <a:r>
               <a:rPr lang="fr-FR" dirty="0" err="1" smtClean="0"/>
@@ -5543,21 +5587,47 @@
             </a:r>
             <a:r>
               <a:rPr lang="fr-FR" dirty="0" smtClean="0"/>
-              <a:t> questions,</a:t>
-            </a:r>
+              <a:t> </a:t>
+            </a:r>
+            <a:r>
+              <a:rPr lang="fr-FR" dirty="0" smtClean="0"/>
+              <a:t>questions</a:t>
+            </a:r>
+            <a:endParaRPr lang="fr-FR" dirty="0" smtClean="0"/>
           </a:p>
           <a:p>
             <a:pPr lvl="2"/>
             <a:r>
+              <a:rPr lang="fr-FR" dirty="0"/>
+              <a:t>T</a:t>
+            </a:r>
+            <a:r>
               <a:rPr lang="fr-FR" dirty="0" smtClean="0"/>
-              <a:t>to diffuse information, </a:t>
-            </a:r>
+              <a:t>o </a:t>
+            </a:r>
+            <a:r>
+              <a:rPr lang="fr-FR" dirty="0" smtClean="0"/>
+              <a:t>diffuse </a:t>
+            </a:r>
+            <a:r>
+              <a:rPr lang="fr-FR" dirty="0" smtClean="0"/>
+              <a:t>information </a:t>
+            </a:r>
+            <a:endParaRPr lang="fr-FR" dirty="0" smtClean="0"/>
           </a:p>
           <a:p>
             <a:pPr lvl="2"/>
             <a:r>
+              <a:rPr lang="fr-FR" dirty="0"/>
+              <a:t>T</a:t>
+            </a:r>
+            <a:r>
               <a:rPr lang="fr-FR" dirty="0" smtClean="0"/>
-              <a:t>to exchange </a:t>
+              <a:t>o </a:t>
+            </a:r>
+            <a:r>
+              <a:rPr lang="fr-FR" dirty="0" smtClean="0"/>
+              <a:t>exchange </a:t>
             </a:r>
             <a:r>
               <a:rPr lang="fr-FR" dirty="0" err="1" smtClean="0"/>
@@ -5578,10 +5648,6 @@
             <a:r>
               <a:rPr lang="fr-FR" dirty="0" err="1" smtClean="0"/>
               <a:t>developpers</a:t>
-            </a:r>
-            <a:r>
-              <a:rPr lang="fr-FR" dirty="0" smtClean="0"/>
-              <a:t>. </a:t>
             </a:r>
             <a:endParaRPr lang="fr-FR" sz="1600" b="1" dirty="0" smtClean="0"/>
           </a:p>
@@ -5625,12 +5691,17 @@
             </a:r>
             <a:r>
               <a:rPr lang="fr-FR" dirty="0" err="1" smtClean="0"/>
-              <a:t>developers</a:t>
+              <a:t>developer</a:t>
             </a:r>
             <a:r>
               <a:rPr lang="fr-FR" dirty="0" smtClean="0"/>
-              <a:t> interviews. </a:t>
-            </a:r>
+              <a:t> </a:t>
+            </a:r>
+            <a:r>
+              <a:rPr lang="fr-FR" dirty="0" smtClean="0"/>
+              <a:t>interviews </a:t>
+            </a:r>
+            <a:endParaRPr lang="fr-FR" dirty="0" smtClean="0"/>
           </a:p>
         </p:txBody>
       </p:sp>
@@ -5643,7 +5714,7 @@
           <p:nvPr/>
         </p:nvPicPr>
         <p:blipFill>
-          <a:blip r:embed="rId2">
+          <a:blip r:embed="rId3">
             <a:extLst>
               <a:ext uri="{28A0092B-C50C-407E-A947-70E740481C1C}">
                 <a14:useLocalDpi xmlns:a14="http://schemas.microsoft.com/office/drawing/2010/main" val="0"/>
@@ -5755,7 +5826,7 @@
           <p:nvPr/>
         </p:nvPicPr>
         <p:blipFill>
-          <a:blip r:embed="rId3"/>
+          <a:blip r:embed="rId4"/>
           <a:stretch>
             <a:fillRect/>
           </a:stretch>
@@ -5778,7 +5849,7 @@
         </p:nvSpPr>
         <p:spPr>
           <a:xfrm>
-            <a:off x="4334294" y="5495574"/>
+            <a:off x="4334294" y="5539878"/>
             <a:ext cx="4269881" cy="646331"/>
           </a:xfrm>
           <a:prstGeom prst="rect">
@@ -5916,233 +5987,234 @@
           <a:lstStyle/>
           <a:p>
             <a:r>
-              <a:rPr lang="fr-FR" sz="2400" dirty="0" smtClean="0"/>
+              <a:rPr lang="fr-FR" sz="2600" dirty="0" smtClean="0"/>
               <a:t>CDS and </a:t>
             </a:r>
             <a:r>
-              <a:rPr lang="fr-FR" sz="2400" dirty="0" err="1" smtClean="0"/>
+              <a:rPr lang="fr-FR" sz="2600" dirty="0" err="1" smtClean="0"/>
               <a:t>LoOPS</a:t>
             </a:r>
             <a:r>
-              <a:rPr lang="fr-FR" sz="2400" dirty="0" smtClean="0"/>
+              <a:rPr lang="fr-FR" sz="2600" dirty="0" smtClean="0"/>
               <a:t> have </a:t>
             </a:r>
             <a:r>
-              <a:rPr lang="fr-FR" sz="2400" dirty="0" err="1" smtClean="0"/>
+              <a:rPr lang="fr-FR" sz="2600" dirty="0" err="1" smtClean="0"/>
               <a:t>common</a:t>
             </a:r>
             <a:r>
-              <a:rPr lang="fr-FR" sz="2400" dirty="0" smtClean="0"/>
+              <a:rPr lang="fr-FR" sz="2600" dirty="0" smtClean="0"/>
               <a:t> </a:t>
             </a:r>
             <a:r>
-              <a:rPr lang="fr-FR" sz="2400" dirty="0" err="1" smtClean="0"/>
+              <a:rPr lang="fr-FR" sz="2600" dirty="0" err="1" smtClean="0"/>
               <a:t>interest</a:t>
             </a:r>
             <a:r>
-              <a:rPr lang="fr-FR" sz="2400" dirty="0" smtClean="0"/>
+              <a:rPr lang="fr-FR" sz="2600" dirty="0" smtClean="0"/>
               <a:t> and expertise in software </a:t>
             </a:r>
             <a:r>
-              <a:rPr lang="fr-FR" sz="2400" dirty="0" err="1" smtClean="0"/>
+              <a:rPr lang="fr-FR" sz="2600" dirty="0" err="1" smtClean="0"/>
               <a:t>development</a:t>
             </a:r>
             <a:r>
-              <a:rPr lang="fr-FR" sz="2400" dirty="0" smtClean="0"/>
+              <a:rPr lang="fr-FR" sz="2600" dirty="0" smtClean="0"/>
               <a:t>. </a:t>
             </a:r>
           </a:p>
           <a:p>
             <a:r>
-              <a:rPr lang="fr-FR" sz="2400" dirty="0" err="1" smtClean="0"/>
+              <a:rPr lang="fr-FR" sz="2600" dirty="0" err="1" smtClean="0"/>
               <a:t>LoOPS</a:t>
             </a:r>
             <a:r>
-              <a:rPr lang="fr-FR" sz="2400" dirty="0" smtClean="0"/>
+              <a:rPr lang="fr-FR" sz="2600" dirty="0" smtClean="0"/>
               <a:t> </a:t>
             </a:r>
             <a:r>
-              <a:rPr lang="fr-FR" sz="2400" dirty="0" err="1" smtClean="0"/>
+              <a:rPr lang="fr-FR" sz="2600" dirty="0" err="1" smtClean="0"/>
               <a:t>members</a:t>
             </a:r>
             <a:r>
-              <a:rPr lang="fr-FR" sz="2400" dirty="0" smtClean="0"/>
+              <a:rPr lang="fr-FR" sz="2600" dirty="0" smtClean="0"/>
               <a:t> </a:t>
             </a:r>
             <a:r>
-              <a:rPr lang="fr-FR" sz="2400" dirty="0" err="1" smtClean="0"/>
+              <a:rPr lang="fr-FR" sz="2600" dirty="0" err="1" smtClean="0"/>
               <a:t>could</a:t>
             </a:r>
             <a:r>
-              <a:rPr lang="fr-FR" sz="2400" dirty="0" smtClean="0"/>
+              <a:rPr lang="fr-FR" sz="2600" dirty="0" smtClean="0"/>
               <a:t> </a:t>
             </a:r>
             <a:r>
-              <a:rPr lang="fr-FR" sz="2400" dirty="0" err="1" smtClean="0"/>
+              <a:rPr lang="fr-FR" sz="2600" dirty="0" err="1" smtClean="0"/>
               <a:t>be</a:t>
             </a:r>
             <a:r>
-              <a:rPr lang="fr-FR" sz="2400" dirty="0" smtClean="0"/>
+              <a:rPr lang="fr-FR" sz="2600" dirty="0" smtClean="0"/>
               <a:t> </a:t>
             </a:r>
             <a:r>
-              <a:rPr lang="fr-FR" sz="2400" dirty="0" err="1" smtClean="0"/>
+              <a:rPr lang="fr-FR" sz="2600" dirty="0" err="1" smtClean="0"/>
               <a:t>interested</a:t>
             </a:r>
             <a:r>
-              <a:rPr lang="fr-FR" sz="2400" dirty="0" smtClean="0"/>
+              <a:rPr lang="fr-FR" sz="2600" dirty="0" smtClean="0"/>
               <a:t> in </a:t>
             </a:r>
             <a:r>
-              <a:rPr lang="fr-FR" sz="2400" dirty="0" err="1" smtClean="0"/>
+              <a:rPr lang="fr-FR" sz="2600" dirty="0" err="1" smtClean="0"/>
               <a:t>participating</a:t>
             </a:r>
             <a:r>
-              <a:rPr lang="fr-FR" sz="2400" dirty="0" smtClean="0"/>
+              <a:rPr lang="fr-FR" sz="2600" dirty="0" smtClean="0"/>
               <a:t> to CDS </a:t>
             </a:r>
             <a:r>
-              <a:rPr lang="fr-FR" sz="2400" dirty="0" err="1" smtClean="0"/>
+              <a:rPr lang="fr-FR" sz="2600" dirty="0" err="1" smtClean="0"/>
               <a:t>projects</a:t>
             </a:r>
             <a:r>
-              <a:rPr lang="fr-FR" sz="2400" dirty="0"/>
+              <a:rPr lang="fr-FR" sz="2600" dirty="0"/>
               <a:t> </a:t>
             </a:r>
             <a:r>
-              <a:rPr lang="fr-FR" sz="2400" dirty="0" smtClean="0"/>
+              <a:rPr lang="fr-FR" sz="2600" dirty="0" smtClean="0"/>
               <a:t>(beta </a:t>
             </a:r>
             <a:r>
-              <a:rPr lang="fr-FR" sz="2400" dirty="0" err="1" smtClean="0"/>
+              <a:rPr lang="fr-FR" sz="2600" dirty="0" err="1" smtClean="0"/>
               <a:t>testers</a:t>
             </a:r>
             <a:r>
-              <a:rPr lang="fr-FR" sz="2400" dirty="0" smtClean="0"/>
+              <a:rPr lang="fr-FR" sz="2600" dirty="0" smtClean="0"/>
               <a:t>, use of new </a:t>
             </a:r>
             <a:r>
-              <a:rPr lang="fr-FR" sz="2400" dirty="0" err="1" smtClean="0"/>
+              <a:rPr lang="fr-FR" sz="2600" dirty="0" err="1" smtClean="0"/>
               <a:t>validated</a:t>
             </a:r>
             <a:r>
-              <a:rPr lang="fr-FR" sz="2400" dirty="0" smtClean="0"/>
+              <a:rPr lang="fr-FR" sz="2600" dirty="0" smtClean="0"/>
               <a:t> </a:t>
             </a:r>
             <a:r>
-              <a:rPr lang="fr-FR" sz="2400" dirty="0" err="1" smtClean="0"/>
+              <a:rPr lang="fr-FR" sz="2600" dirty="0" err="1" smtClean="0"/>
               <a:t>algorithms</a:t>
             </a:r>
             <a:r>
-              <a:rPr lang="fr-FR" sz="2400" dirty="0" smtClean="0"/>
-              <a:t>)</a:t>
-            </a:r>
-          </a:p>
-          <a:p>
-            <a:r>
-              <a:rPr lang="fr-FR" sz="2400" dirty="0" smtClean="0"/>
+              <a:rPr lang="fr-FR" sz="2600" dirty="0" smtClean="0"/>
+              <a:t>).</a:t>
+            </a:r>
+            <a:endParaRPr lang="fr-FR" sz="2600" dirty="0" smtClean="0"/>
+          </a:p>
+          <a:p>
+            <a:r>
+              <a:rPr lang="fr-FR" sz="2600" dirty="0" smtClean="0"/>
               <a:t>The CDS </a:t>
             </a:r>
             <a:r>
-              <a:rPr lang="fr-FR" sz="2400" dirty="0" err="1" smtClean="0"/>
+              <a:rPr lang="fr-FR" sz="2600" dirty="0" err="1" smtClean="0"/>
               <a:t>could</a:t>
             </a:r>
             <a:r>
-              <a:rPr lang="fr-FR" sz="2400" dirty="0" smtClean="0"/>
+              <a:rPr lang="fr-FR" sz="2600" dirty="0" smtClean="0"/>
               <a:t> </a:t>
             </a:r>
             <a:r>
-              <a:rPr lang="fr-FR" sz="2400" dirty="0" err="1" smtClean="0"/>
+              <a:rPr lang="fr-FR" sz="2600" dirty="0" err="1" smtClean="0"/>
               <a:t>also</a:t>
             </a:r>
             <a:r>
-              <a:rPr lang="fr-FR" sz="2400" dirty="0" smtClean="0"/>
+              <a:rPr lang="fr-FR" sz="2600" dirty="0" smtClean="0"/>
               <a:t> </a:t>
             </a:r>
             <a:r>
-              <a:rPr lang="fr-FR" sz="2400" dirty="0" err="1" smtClean="0"/>
+              <a:rPr lang="fr-FR" sz="2600" dirty="0" err="1" smtClean="0"/>
               <a:t>learn</a:t>
             </a:r>
             <a:r>
-              <a:rPr lang="fr-FR" sz="2400" dirty="0" smtClean="0"/>
+              <a:rPr lang="fr-FR" sz="2600" dirty="0" smtClean="0"/>
               <a:t> </a:t>
             </a:r>
             <a:r>
-              <a:rPr lang="fr-FR" sz="2400" dirty="0" err="1" smtClean="0"/>
+              <a:rPr lang="fr-FR" sz="2600" dirty="0" err="1" smtClean="0"/>
               <a:t>from</a:t>
             </a:r>
             <a:r>
-              <a:rPr lang="fr-FR" sz="2400" dirty="0" smtClean="0"/>
+              <a:rPr lang="fr-FR" sz="2600" dirty="0" smtClean="0"/>
               <a:t> the expertise of </a:t>
             </a:r>
             <a:r>
-              <a:rPr lang="fr-FR" sz="2400" dirty="0" err="1" smtClean="0"/>
+              <a:rPr lang="fr-FR" sz="2600" dirty="0" err="1" smtClean="0"/>
               <a:t>LoOPS</a:t>
             </a:r>
             <a:r>
-              <a:rPr lang="fr-FR" sz="2400" dirty="0" smtClean="0"/>
+              <a:rPr lang="fr-FR" sz="2600" dirty="0" smtClean="0"/>
               <a:t> </a:t>
             </a:r>
             <a:r>
-              <a:rPr lang="fr-FR" sz="2400" dirty="0" err="1" smtClean="0"/>
+              <a:rPr lang="fr-FR" sz="2600" dirty="0" err="1" smtClean="0"/>
               <a:t>members</a:t>
             </a:r>
             <a:r>
-              <a:rPr lang="fr-FR" sz="2400" dirty="0" smtClean="0"/>
+              <a:rPr lang="fr-FR" sz="2600" dirty="0" smtClean="0"/>
               <a:t>.</a:t>
             </a:r>
           </a:p>
           <a:p>
             <a:r>
-              <a:rPr lang="fr-FR" sz="2400" dirty="0" smtClean="0"/>
+              <a:rPr lang="fr-FR" sz="2600" dirty="0" smtClean="0"/>
               <a:t>The CDS </a:t>
             </a:r>
             <a:r>
-              <a:rPr lang="fr-FR" sz="2400" dirty="0" err="1" smtClean="0"/>
+              <a:rPr lang="fr-FR" sz="2600" dirty="0" err="1" smtClean="0"/>
               <a:t>can</a:t>
             </a:r>
             <a:r>
-              <a:rPr lang="fr-FR" sz="2400" dirty="0" smtClean="0"/>
+              <a:rPr lang="fr-FR" sz="2600" dirty="0" smtClean="0"/>
               <a:t> </a:t>
             </a:r>
             <a:r>
-              <a:rPr lang="fr-FR" sz="2400" dirty="0" err="1" smtClean="0"/>
+              <a:rPr lang="fr-FR" sz="2600" dirty="0" err="1" smtClean="0"/>
               <a:t>also</a:t>
             </a:r>
             <a:r>
-              <a:rPr lang="fr-FR" sz="2400" dirty="0" smtClean="0"/>
+              <a:rPr lang="fr-FR" sz="2600" dirty="0" smtClean="0"/>
               <a:t> </a:t>
             </a:r>
             <a:r>
-              <a:rPr lang="fr-FR" sz="2400" dirty="0" err="1" smtClean="0"/>
+              <a:rPr lang="fr-FR" sz="2600" dirty="0" err="1" smtClean="0"/>
               <a:t>be</a:t>
             </a:r>
             <a:r>
-              <a:rPr lang="fr-FR" sz="2400" dirty="0" smtClean="0"/>
+              <a:rPr lang="fr-FR" sz="2600" dirty="0" smtClean="0"/>
               <a:t> </a:t>
             </a:r>
             <a:r>
-              <a:rPr lang="fr-FR" sz="2400" dirty="0" err="1" smtClean="0"/>
+              <a:rPr lang="fr-FR" sz="2600" dirty="0" err="1" smtClean="0"/>
               <a:t>interested</a:t>
             </a:r>
             <a:r>
-              <a:rPr lang="fr-FR" sz="2400" dirty="0" smtClean="0"/>
+              <a:rPr lang="fr-FR" sz="2600" dirty="0" smtClean="0"/>
               <a:t> in </a:t>
             </a:r>
             <a:r>
-              <a:rPr lang="fr-FR" sz="2400" dirty="0" err="1" smtClean="0"/>
+              <a:rPr lang="fr-FR" sz="2600" dirty="0" err="1" smtClean="0"/>
               <a:t>LoOPS</a:t>
             </a:r>
             <a:r>
-              <a:rPr lang="fr-FR" sz="2400" dirty="0" smtClean="0"/>
+              <a:rPr lang="fr-FR" sz="2600" dirty="0" smtClean="0"/>
               <a:t> </a:t>
             </a:r>
             <a:r>
-              <a:rPr lang="fr-FR" sz="2400" dirty="0" err="1" smtClean="0"/>
+              <a:rPr lang="fr-FR" sz="2600" dirty="0" err="1" smtClean="0"/>
               <a:t>members</a:t>
             </a:r>
             <a:r>
-              <a:rPr lang="fr-FR" sz="2400" dirty="0" smtClean="0"/>
+              <a:rPr lang="fr-FR" sz="2600" dirty="0" smtClean="0"/>
               <a:t> data.</a:t>
             </a:r>
           </a:p>
@@ -6328,7 +6400,7 @@
             </a:r>
             <a:r>
               <a:rPr lang="fr-FR" sz="2400" dirty="0" smtClean="0"/>
-              <a:t> on :</a:t>
+              <a:t> on:</a:t>
             </a:r>
           </a:p>
           <a:p>

</xml_diff>

<commit_message>
Dernières modifs CH, peut-être :-)
</commit_message>
<xml_diff>
--- a/presentations/PrésentationLoOPSAnglais.pptx
+++ b/presentations/PrésentationLoOPSAnglais.pptx
@@ -1,6 +1,6 @@
 
 <file path=ppt/presentation.xml><?xml version="1.0" encoding="utf-8"?>
-<p:presentation xmlns:a="http://schemas.openxmlformats.org/drawingml/2006/main" xmlns:r="http://schemas.openxmlformats.org/officeDocument/2006/relationships" xmlns:p="http://schemas.openxmlformats.org/presentationml/2006/main" saveSubsetFonts="1" autoCompressPictures="0">
+<p:presentation xmlns:a="http://schemas.openxmlformats.org/drawingml/2006/main" xmlns:r="http://schemas.openxmlformats.org/officeDocument/2006/relationships" xmlns:p="http://schemas.openxmlformats.org/presentationml/2006/main" showSpecialPlsOnTitleSld="0" saveSubsetFonts="1" autoCompressPictures="0">
   <p:sldMasterIdLst>
     <p:sldMasterId id="2147483648" r:id="rId1"/>
   </p:sldMasterIdLst>
@@ -823,7 +823,7 @@
           <a:p>
             <a:r>
               <a:rPr lang="fr-FR" smtClean="0"/>
-              <a:t>26/10/15</a:t>
+              <a:t>October 26th, 2015</a:t>
             </a:r>
             <a:endParaRPr lang="fr-FR"/>
           </a:p>
@@ -846,7 +846,7 @@
           <a:p>
             <a:r>
               <a:rPr lang="fr-FR" smtClean="0"/>
-              <a:t>CDS Open Software Day</a:t>
+              <a:t>CDS Open Software Initiative</a:t>
             </a:r>
             <a:endParaRPr lang="fr-FR"/>
           </a:p>
@@ -1013,7 +1013,7 @@
           <a:p>
             <a:r>
               <a:rPr lang="fr-FR" smtClean="0"/>
-              <a:t>26/10/15</a:t>
+              <a:t>October 26th, 2015</a:t>
             </a:r>
             <a:endParaRPr lang="fr-FR"/>
           </a:p>
@@ -1036,7 +1036,7 @@
           <a:p>
             <a:r>
               <a:rPr lang="fr-FR" smtClean="0"/>
-              <a:t>CDS Open Software Day</a:t>
+              <a:t>CDS Open Software Initiative</a:t>
             </a:r>
             <a:endParaRPr lang="fr-FR"/>
           </a:p>
@@ -1203,7 +1203,7 @@
           <a:p>
             <a:r>
               <a:rPr lang="fr-FR" smtClean="0"/>
-              <a:t>26/10/15</a:t>
+              <a:t>October 26th, 2015</a:t>
             </a:r>
             <a:endParaRPr lang="fr-FR"/>
           </a:p>
@@ -1226,7 +1226,7 @@
           <a:p>
             <a:r>
               <a:rPr lang="fr-FR" smtClean="0"/>
-              <a:t>CDS Open Software Day</a:t>
+              <a:t>CDS Open Software Initiative</a:t>
             </a:r>
             <a:endParaRPr lang="fr-FR"/>
           </a:p>
@@ -1393,7 +1393,7 @@
           <a:p>
             <a:r>
               <a:rPr lang="fr-FR" smtClean="0"/>
-              <a:t>26/10/15</a:t>
+              <a:t>October 26th, 2015</a:t>
             </a:r>
             <a:endParaRPr lang="fr-FR"/>
           </a:p>
@@ -1416,7 +1416,7 @@
           <a:p>
             <a:r>
               <a:rPr lang="fr-FR" smtClean="0"/>
-              <a:t>CDS Open Software Day</a:t>
+              <a:t>CDS Open Software Initiative</a:t>
             </a:r>
             <a:endParaRPr lang="fr-FR"/>
           </a:p>
@@ -1649,7 +1649,7 @@
           <a:p>
             <a:r>
               <a:rPr lang="fr-FR" smtClean="0"/>
-              <a:t>26/10/15</a:t>
+              <a:t>October 26th, 2015</a:t>
             </a:r>
             <a:endParaRPr lang="fr-FR"/>
           </a:p>
@@ -1672,7 +1672,7 @@
           <a:p>
             <a:r>
               <a:rPr lang="fr-FR" smtClean="0"/>
-              <a:t>CDS Open Software Day</a:t>
+              <a:t>CDS Open Software Initiative</a:t>
             </a:r>
             <a:endParaRPr lang="fr-FR"/>
           </a:p>
@@ -1955,7 +1955,7 @@
           <a:p>
             <a:r>
               <a:rPr lang="fr-FR" smtClean="0"/>
-              <a:t>26/10/15</a:t>
+              <a:t>October 26th, 2015</a:t>
             </a:r>
             <a:endParaRPr lang="fr-FR"/>
           </a:p>
@@ -1978,7 +1978,7 @@
           <a:p>
             <a:r>
               <a:rPr lang="fr-FR" smtClean="0"/>
-              <a:t>CDS Open Software Day</a:t>
+              <a:t>CDS Open Software Initiative</a:t>
             </a:r>
             <a:endParaRPr lang="fr-FR"/>
           </a:p>
@@ -2401,7 +2401,7 @@
           <a:p>
             <a:r>
               <a:rPr lang="fr-FR" smtClean="0"/>
-              <a:t>26/10/15</a:t>
+              <a:t>October 26th, 2015</a:t>
             </a:r>
             <a:endParaRPr lang="fr-FR"/>
           </a:p>
@@ -2424,7 +2424,7 @@
           <a:p>
             <a:r>
               <a:rPr lang="fr-FR" smtClean="0"/>
-              <a:t>CDS Open Software Day</a:t>
+              <a:t>CDS Open Software Initiative</a:t>
             </a:r>
             <a:endParaRPr lang="fr-FR"/>
           </a:p>
@@ -2531,7 +2531,7 @@
           <a:p>
             <a:r>
               <a:rPr lang="fr-FR" smtClean="0"/>
-              <a:t>26/10/15</a:t>
+              <a:t>October 26th, 2015</a:t>
             </a:r>
             <a:endParaRPr lang="fr-FR"/>
           </a:p>
@@ -2554,7 +2554,7 @@
           <a:p>
             <a:r>
               <a:rPr lang="fr-FR" smtClean="0"/>
-              <a:t>CDS Open Software Day</a:t>
+              <a:t>CDS Open Software Initiative</a:t>
             </a:r>
             <a:endParaRPr lang="fr-FR"/>
           </a:p>
@@ -2630,7 +2630,7 @@
           <a:p>
             <a:r>
               <a:rPr lang="fr-FR" smtClean="0"/>
-              <a:t>26/10/15</a:t>
+              <a:t>October 26th, 2015</a:t>
             </a:r>
             <a:endParaRPr lang="fr-FR"/>
           </a:p>
@@ -2653,7 +2653,7 @@
           <a:p>
             <a:r>
               <a:rPr lang="fr-FR" smtClean="0"/>
-              <a:t>CDS Open Software Day</a:t>
+              <a:t>CDS Open Software Initiative</a:t>
             </a:r>
             <a:endParaRPr lang="fr-FR"/>
           </a:p>
@@ -2920,7 +2920,7 @@
           <a:p>
             <a:r>
               <a:rPr lang="fr-FR" smtClean="0"/>
-              <a:t>26/10/15</a:t>
+              <a:t>October 26th, 2015</a:t>
             </a:r>
             <a:endParaRPr lang="fr-FR"/>
           </a:p>
@@ -2943,7 +2943,7 @@
           <a:p>
             <a:r>
               <a:rPr lang="fr-FR" smtClean="0"/>
-              <a:t>CDS Open Software Day</a:t>
+              <a:t>CDS Open Software Initiative</a:t>
             </a:r>
             <a:endParaRPr lang="fr-FR"/>
           </a:p>
@@ -3186,7 +3186,7 @@
           <a:p>
             <a:r>
               <a:rPr lang="fr-FR" smtClean="0"/>
-              <a:t>26/10/15</a:t>
+              <a:t>October 26th, 2015</a:t>
             </a:r>
             <a:endParaRPr lang="fr-FR"/>
           </a:p>
@@ -3209,7 +3209,7 @@
           <a:p>
             <a:r>
               <a:rPr lang="fr-FR" smtClean="0"/>
-              <a:t>CDS Open Software Day</a:t>
+              <a:t>CDS Open Software Initiative</a:t>
             </a:r>
             <a:endParaRPr lang="fr-FR"/>
           </a:p>
@@ -3362,7 +3362,7 @@
           <a:p>
             <a:r>
               <a:rPr lang="fr-FR" smtClean="0"/>
-              <a:t>26/10/15</a:t>
+              <a:t>October 26th, 2015</a:t>
             </a:r>
             <a:endParaRPr lang="fr-FR" dirty="0"/>
           </a:p>
@@ -3403,7 +3403,7 @@
           <a:p>
             <a:r>
               <a:rPr lang="fr-FR" smtClean="0"/>
-              <a:t>CDS Open Software Day</a:t>
+              <a:t>CDS Open Software Initiative</a:t>
             </a:r>
             <a:endParaRPr lang="fr-FR" dirty="0"/>
           </a:p>
@@ -3575,7 +3575,7 @@
     <p:sldLayoutId id="2147483658" r:id="rId10"/>
     <p:sldLayoutId id="2147483659" r:id="rId11"/>
   </p:sldLayoutIdLst>
-  <p:hf sldNum="0" hdr="0"/>
+  <p:hf hdr="0"/>
   <p:txStyles>
     <p:titleStyle>
       <a:lvl1pPr algn="ctr" defTabSz="457200" rtl="0" eaLnBrk="1" latinLnBrk="0" hangingPunct="1">
@@ -3901,52 +3901,6 @@
           </a:p>
         </p:txBody>
       </p:sp>
-      <p:sp>
-        <p:nvSpPr>
-          <p:cNvPr id="4" name="Espace réservé de la date 3"/>
-          <p:cNvSpPr>
-            <a:spLocks noGrp="1"/>
-          </p:cNvSpPr>
-          <p:nvPr>
-            <p:ph type="dt" sz="half" idx="10"/>
-          </p:nvPr>
-        </p:nvSpPr>
-        <p:spPr/>
-        <p:txBody>
-          <a:bodyPr/>
-          <a:lstStyle/>
-          <a:p>
-            <a:r>
-              <a:rPr lang="fr-FR" smtClean="0"/>
-              <a:t>26/10/15</a:t>
-            </a:r>
-            <a:endParaRPr lang="fr-FR"/>
-          </a:p>
-        </p:txBody>
-      </p:sp>
-      <p:sp>
-        <p:nvSpPr>
-          <p:cNvPr id="5" name="Espace réservé du pied de page 4"/>
-          <p:cNvSpPr>
-            <a:spLocks noGrp="1"/>
-          </p:cNvSpPr>
-          <p:nvPr>
-            <p:ph type="ftr" sz="quarter" idx="11"/>
-          </p:nvPr>
-        </p:nvSpPr>
-        <p:spPr/>
-        <p:txBody>
-          <a:bodyPr/>
-          <a:lstStyle/>
-          <a:p>
-            <a:r>
-              <a:rPr lang="fr-FR" smtClean="0"/>
-              <a:t>CDS Open Software Day</a:t>
-            </a:r>
-            <a:endParaRPr lang="fr-FR"/>
-          </a:p>
-        </p:txBody>
-      </p:sp>
     </p:spTree>
     <p:extLst>
       <p:ext uri="{BB962C8B-B14F-4D97-AF65-F5344CB8AC3E}">
@@ -4100,7 +4054,7 @@
           <a:p>
             <a:r>
               <a:rPr lang="fr-FR" smtClean="0"/>
-              <a:t>CDS Open Software Day</a:t>
+              <a:t>CDS Open Software Initiative</a:t>
             </a:r>
             <a:endParaRPr lang="fr-FR"/>
           </a:p>
@@ -4123,8 +4077,31 @@
           <a:p>
             <a:r>
               <a:rPr lang="fr-FR" smtClean="0"/>
-              <a:t>26/10/15</a:t>
-            </a:r>
+              <a:t>October 26th, 2015</a:t>
+            </a:r>
+            <a:endParaRPr lang="fr-FR"/>
+          </a:p>
+        </p:txBody>
+      </p:sp>
+      <p:sp>
+        <p:nvSpPr>
+          <p:cNvPr id="4" name="Espace réservé du numéro de diapositive 3"/>
+          <p:cNvSpPr>
+            <a:spLocks noGrp="1"/>
+          </p:cNvSpPr>
+          <p:nvPr>
+            <p:ph type="sldNum" sz="quarter" idx="12"/>
+          </p:nvPr>
+        </p:nvSpPr>
+        <p:spPr/>
+        <p:txBody>
+          <a:bodyPr/>
+          <a:lstStyle/>
+          <a:p>
+            <a:fld id="{9EDC6D86-14D3-3648-AF53-8E1A2FD4027D}" type="slidenum">
+              <a:rPr lang="fr-FR" smtClean="0"/>
+              <a:t>2</a:t>
+            </a:fld>
             <a:endParaRPr lang="fr-FR"/>
           </a:p>
         </p:txBody>
@@ -4579,7 +4556,7 @@
           <a:p>
             <a:r>
               <a:rPr lang="fr-FR" smtClean="0"/>
-              <a:t>CDS Open Software Day</a:t>
+              <a:t>CDS Open Software Initiative</a:t>
             </a:r>
             <a:endParaRPr lang="fr-FR"/>
           </a:p>
@@ -4602,8 +4579,31 @@
           <a:p>
             <a:r>
               <a:rPr lang="fr-FR" smtClean="0"/>
-              <a:t>26/10/15</a:t>
-            </a:r>
+              <a:t>October 26th, 2015</a:t>
+            </a:r>
+            <a:endParaRPr lang="fr-FR"/>
+          </a:p>
+        </p:txBody>
+      </p:sp>
+      <p:sp>
+        <p:nvSpPr>
+          <p:cNvPr id="6" name="Espace réservé du numéro de diapositive 5"/>
+          <p:cNvSpPr>
+            <a:spLocks noGrp="1"/>
+          </p:cNvSpPr>
+          <p:nvPr>
+            <p:ph type="sldNum" sz="quarter" idx="12"/>
+          </p:nvPr>
+        </p:nvSpPr>
+        <p:spPr/>
+        <p:txBody>
+          <a:bodyPr/>
+          <a:lstStyle/>
+          <a:p>
+            <a:fld id="{9EDC6D86-14D3-3648-AF53-8E1A2FD4027D}" type="slidenum">
+              <a:rPr lang="fr-FR" smtClean="0"/>
+              <a:t>3</a:t>
+            </a:fld>
             <a:endParaRPr lang="fr-FR"/>
           </a:p>
         </p:txBody>
@@ -5090,7 +5090,7 @@
           <a:p>
             <a:r>
               <a:rPr lang="fr-FR" smtClean="0"/>
-              <a:t>CDS Open Software Day</a:t>
+              <a:t>CDS Open Software Initiative</a:t>
             </a:r>
             <a:endParaRPr lang="fr-FR"/>
           </a:p>
@@ -5302,8 +5302,31 @@
           <a:p>
             <a:r>
               <a:rPr lang="fr-FR" smtClean="0"/>
-              <a:t>26/10/15</a:t>
-            </a:r>
+              <a:t>October 26th, 2015</a:t>
+            </a:r>
+            <a:endParaRPr lang="fr-FR"/>
+          </a:p>
+        </p:txBody>
+      </p:sp>
+      <p:sp>
+        <p:nvSpPr>
+          <p:cNvPr id="5" name="Espace réservé du numéro de diapositive 4"/>
+          <p:cNvSpPr>
+            <a:spLocks noGrp="1"/>
+          </p:cNvSpPr>
+          <p:nvPr>
+            <p:ph type="sldNum" sz="quarter" idx="12"/>
+          </p:nvPr>
+        </p:nvSpPr>
+        <p:spPr/>
+        <p:txBody>
+          <a:bodyPr/>
+          <a:lstStyle/>
+          <a:p>
+            <a:fld id="{9EDC6D86-14D3-3648-AF53-8E1A2FD4027D}" type="slidenum">
+              <a:rPr lang="fr-FR" smtClean="0"/>
+              <a:t>4</a:t>
+            </a:fld>
             <a:endParaRPr lang="fr-FR"/>
           </a:p>
         </p:txBody>
@@ -5511,13 +5534,8 @@
             </a:r>
             <a:r>
               <a:rPr lang="fr-FR" dirty="0" smtClean="0"/>
-              <a:t>-dojos</a:t>
-            </a:r>
-            <a:r>
-              <a:rPr lang="fr-FR" dirty="0" smtClean="0"/>
-              <a:t>)</a:t>
-            </a:r>
-            <a:endParaRPr lang="fr-FR" dirty="0" smtClean="0"/>
+              <a:t>-dojos)</a:t>
+            </a:r>
           </a:p>
           <a:p>
             <a:pPr marL="457200" lvl="1" indent="0">
@@ -5587,13 +5605,8 @@
             </a:r>
             <a:r>
               <a:rPr lang="fr-FR" dirty="0" smtClean="0"/>
-              <a:t> </a:t>
-            </a:r>
-            <a:r>
-              <a:rPr lang="fr-FR" dirty="0" smtClean="0"/>
-              <a:t>questions</a:t>
-            </a:r>
-            <a:endParaRPr lang="fr-FR" dirty="0" smtClean="0"/>
+              <a:t> questions</a:t>
+            </a:r>
           </a:p>
           <a:p>
             <a:pPr lvl="2"/>
@@ -5606,14 +5619,17 @@
               <a:t>o </a:t>
             </a:r>
             <a:r>
+              <a:rPr lang="fr-FR" dirty="0" err="1" smtClean="0"/>
+              <a:t>share</a:t>
+            </a:r>
+            <a:r>
               <a:rPr lang="fr-FR" dirty="0" smtClean="0"/>
-              <a:t>diffuse </a:t>
+              <a:t> </a:t>
             </a:r>
             <a:r>
               <a:rPr lang="fr-FR" dirty="0" smtClean="0"/>
               <a:t>information </a:t>
             </a:r>
-            <a:endParaRPr lang="fr-FR" dirty="0" smtClean="0"/>
           </a:p>
           <a:p>
             <a:pPr lvl="2"/>
@@ -5623,11 +5639,7 @@
             </a:r>
             <a:r>
               <a:rPr lang="fr-FR" dirty="0" smtClean="0"/>
-              <a:t>o </a:t>
-            </a:r>
-            <a:r>
-              <a:rPr lang="fr-FR" dirty="0" smtClean="0"/>
-              <a:t>exchange </a:t>
+              <a:t>o exchange </a:t>
             </a:r>
             <a:r>
               <a:rPr lang="fr-FR" dirty="0" err="1" smtClean="0"/>
@@ -5695,13 +5707,8 @@
             </a:r>
             <a:r>
               <a:rPr lang="fr-FR" dirty="0" smtClean="0"/>
-              <a:t> </a:t>
-            </a:r>
-            <a:r>
-              <a:rPr lang="fr-FR" dirty="0" smtClean="0"/>
-              <a:t>interviews </a:t>
-            </a:r>
-            <a:endParaRPr lang="fr-FR" dirty="0" smtClean="0"/>
+              <a:t> interviews </a:t>
+            </a:r>
           </a:p>
         </p:txBody>
       </p:sp>
@@ -5787,8 +5794,8 @@
           <a:lstStyle/>
           <a:p>
             <a:r>
-              <a:rPr lang="fr-FR" dirty="0" smtClean="0"/>
-              <a:t>CDS Open Software Day</a:t>
+              <a:rPr lang="fr-FR" smtClean="0"/>
+              <a:t>CDS Open Software Initiative</a:t>
             </a:r>
             <a:endParaRPr lang="fr-FR" dirty="0"/>
           </a:p>
@@ -5811,7 +5818,7 @@
           <a:p>
             <a:r>
               <a:rPr lang="fr-FR" smtClean="0"/>
-              <a:t>26/10/15</a:t>
+              <a:t>October 26th, 2015</a:t>
             </a:r>
             <a:endParaRPr lang="fr-FR"/>
           </a:p>
@@ -5895,6 +5902,29 @@
           </a:p>
           <a:p>
             <a:endParaRPr lang="fr-FR" dirty="0"/>
+          </a:p>
+        </p:txBody>
+      </p:sp>
+      <p:sp>
+        <p:nvSpPr>
+          <p:cNvPr id="6" name="Espace réservé du numéro de diapositive 5"/>
+          <p:cNvSpPr>
+            <a:spLocks noGrp="1"/>
+          </p:cNvSpPr>
+          <p:nvPr>
+            <p:ph type="sldNum" sz="quarter" idx="12"/>
+          </p:nvPr>
+        </p:nvSpPr>
+        <p:spPr/>
+        <p:txBody>
+          <a:bodyPr/>
+          <a:lstStyle/>
+          <a:p>
+            <a:fld id="{9EDC6D86-14D3-3648-AF53-8E1A2FD4027D}" type="slidenum">
+              <a:rPr lang="fr-FR" smtClean="0"/>
+              <a:t>5</a:t>
+            </a:fld>
+            <a:endParaRPr lang="fr-FR"/>
           </a:p>
         </p:txBody>
       </p:sp>
@@ -6070,7 +6100,19 @@
             </a:r>
             <a:r>
               <a:rPr lang="fr-FR" sz="2600" dirty="0" smtClean="0"/>
-              <a:t> to CDS </a:t>
+              <a:t> </a:t>
+            </a:r>
+            <a:r>
+              <a:rPr lang="fr-FR" sz="2600" dirty="0" smtClean="0"/>
+              <a:t>in</a:t>
+            </a:r>
+            <a:r>
+              <a:rPr lang="fr-FR" sz="2600" dirty="0" smtClean="0"/>
+              <a:t> </a:t>
+            </a:r>
+            <a:r>
+              <a:rPr lang="fr-FR" sz="2600" dirty="0" smtClean="0"/>
+              <a:t>CDS </a:t>
             </a:r>
             <a:r>
               <a:rPr lang="fr-FR" sz="2600" dirty="0" err="1" smtClean="0"/>
@@ -6108,7 +6150,6 @@
               <a:rPr lang="fr-FR" sz="2600" dirty="0" smtClean="0"/>
               <a:t>).</a:t>
             </a:r>
-            <a:endParaRPr lang="fr-FR" sz="2600" dirty="0" smtClean="0"/>
           </a:p>
           <a:p>
             <a:r>
@@ -6243,7 +6284,7 @@
           <a:p>
             <a:r>
               <a:rPr lang="fr-FR" smtClean="0"/>
-              <a:t>CDS Open Software Day</a:t>
+              <a:t>CDS Open Software Initiative</a:t>
             </a:r>
             <a:endParaRPr lang="fr-FR"/>
           </a:p>
@@ -6266,8 +6307,31 @@
           <a:p>
             <a:r>
               <a:rPr lang="fr-FR" smtClean="0"/>
-              <a:t>26/10/15</a:t>
-            </a:r>
+              <a:t>October 26th, 2015</a:t>
+            </a:r>
+            <a:endParaRPr lang="fr-FR"/>
+          </a:p>
+        </p:txBody>
+      </p:sp>
+      <p:sp>
+        <p:nvSpPr>
+          <p:cNvPr id="4" name="Espace réservé du numéro de diapositive 3"/>
+          <p:cNvSpPr>
+            <a:spLocks noGrp="1"/>
+          </p:cNvSpPr>
+          <p:nvPr>
+            <p:ph type="sldNum" sz="quarter" idx="12"/>
+          </p:nvPr>
+        </p:nvSpPr>
+        <p:spPr/>
+        <p:txBody>
+          <a:bodyPr/>
+          <a:lstStyle/>
+          <a:p>
+            <a:fld id="{9EDC6D86-14D3-3648-AF53-8E1A2FD4027D}" type="slidenum">
+              <a:rPr lang="fr-FR" smtClean="0"/>
+              <a:t>6</a:t>
+            </a:fld>
             <a:endParaRPr lang="fr-FR"/>
           </a:p>
         </p:txBody>
@@ -6400,8 +6464,17 @@
             </a:r>
             <a:r>
               <a:rPr lang="fr-FR" sz="2400" dirty="0" smtClean="0"/>
-              <a:t> on:</a:t>
-            </a:r>
+              <a:t> </a:t>
+            </a:r>
+            <a:r>
+              <a:rPr lang="fr-FR" sz="2400" dirty="0" err="1" smtClean="0"/>
+              <a:t>at</a:t>
+            </a:r>
+            <a:r>
+              <a:rPr lang="fr-FR" sz="2400" dirty="0" smtClean="0"/>
+              <a:t>:</a:t>
+            </a:r>
+            <a:endParaRPr lang="fr-FR" sz="2400" dirty="0" smtClean="0"/>
           </a:p>
           <a:p>
             <a:pPr marL="0" indent="0">
@@ -6710,7 +6783,7 @@
           <a:p>
             <a:r>
               <a:rPr lang="fr-FR" smtClean="0"/>
-              <a:t>CDS Open Software Day</a:t>
+              <a:t>CDS Open Software Initiative</a:t>
             </a:r>
             <a:endParaRPr lang="fr-FR"/>
           </a:p>
@@ -6790,8 +6863,31 @@
           <a:p>
             <a:r>
               <a:rPr lang="fr-FR" smtClean="0"/>
-              <a:t>26/10/15</a:t>
-            </a:r>
+              <a:t>October 26th, 2015</a:t>
+            </a:r>
+            <a:endParaRPr lang="fr-FR"/>
+          </a:p>
+        </p:txBody>
+      </p:sp>
+      <p:sp>
+        <p:nvSpPr>
+          <p:cNvPr id="5" name="Espace réservé du numéro de diapositive 4"/>
+          <p:cNvSpPr>
+            <a:spLocks noGrp="1"/>
+          </p:cNvSpPr>
+          <p:nvPr>
+            <p:ph type="sldNum" sz="quarter" idx="12"/>
+          </p:nvPr>
+        </p:nvSpPr>
+        <p:spPr/>
+        <p:txBody>
+          <a:bodyPr/>
+          <a:lstStyle/>
+          <a:p>
+            <a:fld id="{9EDC6D86-14D3-3648-AF53-8E1A2FD4027D}" type="slidenum">
+              <a:rPr lang="fr-FR" smtClean="0"/>
+              <a:t>7</a:t>
+            </a:fld>
             <a:endParaRPr lang="fr-FR"/>
           </a:p>
         </p:txBody>

</xml_diff>

<commit_message>
Update Présentation LoOPS en anglais et rajout lien affiche dans page 7ième journée
</commit_message>
<xml_diff>
--- a/presentations/PrésentationLoOPSAnglais.pptx
+++ b/presentations/PrésentationLoOPSAnglais.pptx
@@ -17,7 +17,7 @@
     <p:sldId id="259" r:id="rId5"/>
     <p:sldId id="260" r:id="rId6"/>
     <p:sldId id="261" r:id="rId7"/>
-    <p:sldId id="262" r:id="rId8"/>
+    <p:sldId id="263" r:id="rId8"/>
   </p:sldIdLst>
   <p:sldSz cx="9144000" cy="6858000" type="screen4x3"/>
   <p:notesSz cx="6858000" cy="9144000"/>
@@ -201,7 +201,7 @@
           <a:p>
             <a:fld id="{99734DAD-B8A5-CA4D-AB71-C93C2527309C}" type="datetimeFigureOut">
               <a:rPr lang="fr-FR" smtClean="0"/>
-              <a:t>20/10/15</a:t>
+              <a:t>25/10/15</a:t>
             </a:fld>
             <a:endParaRPr lang="fr-FR"/>
           </a:p>
@@ -367,7 +367,7 @@
           <a:p>
             <a:fld id="{D50D922F-5A0C-8640-8E2E-DF9344F4008A}" type="datetimeFigureOut">
               <a:rPr lang="fr-FR" smtClean="0"/>
-              <a:t>20/10/15</a:t>
+              <a:t>25/10/15</a:t>
             </a:fld>
             <a:endParaRPr lang="fr-FR"/>
           </a:p>
@@ -4143,6 +4143,36 @@
           <a:chExt cx="0" cy="0"/>
         </a:xfrm>
       </p:grpSpPr>
+      <p:pic>
+        <p:nvPicPr>
+          <p:cNvPr id="8" name="Image 7" descr="MapEiffelLoops.tiff"/>
+          <p:cNvPicPr>
+            <a:picLocks noChangeAspect="1"/>
+          </p:cNvPicPr>
+          <p:nvPr/>
+        </p:nvPicPr>
+        <p:blipFill>
+          <a:blip r:embed="rId2">
+            <a:extLst>
+              <a:ext uri="{28A0092B-C50C-407E-A947-70E740481C1C}">
+                <a14:useLocalDpi xmlns:a14="http://schemas.microsoft.com/office/drawing/2010/main" val="0"/>
+              </a:ext>
+            </a:extLst>
+          </a:blip>
+          <a:stretch>
+            <a:fillRect/>
+          </a:stretch>
+        </p:blipFill>
+        <p:spPr>
+          <a:xfrm>
+            <a:off x="6690057" y="1905192"/>
+            <a:ext cx="1747948" cy="1394069"/>
+          </a:xfrm>
+          <a:prstGeom prst="rect">
+            <a:avLst/>
+          </a:prstGeom>
+        </p:spPr>
+      </p:pic>
       <p:sp>
         <p:nvSpPr>
           <p:cNvPr id="2" name="Titre 1"/>
@@ -4518,7 +4548,7 @@
           <p:nvPr/>
         </p:nvPicPr>
         <p:blipFill>
-          <a:blip r:embed="rId2">
+          <a:blip r:embed="rId3">
             <a:extLst>
               <a:ext uri="{28A0092B-C50C-407E-A947-70E740481C1C}">
                 <a14:useLocalDpi xmlns:a14="http://schemas.microsoft.com/office/drawing/2010/main" val="0"/>
@@ -5605,8 +5635,17 @@
             </a:r>
             <a:r>
               <a:rPr lang="fr-FR" dirty="0" smtClean="0"/>
+              <a:t> </a:t>
+            </a:r>
+            <a:r>
+              <a:rPr lang="fr-FR" dirty="0" err="1" smtClean="0"/>
+              <a:t>technical</a:t>
+            </a:r>
+            <a:r>
+              <a:rPr lang="fr-FR" dirty="0" smtClean="0"/>
               <a:t> questions</a:t>
             </a:r>
+            <a:endParaRPr lang="fr-FR" dirty="0" smtClean="0"/>
           </a:p>
           <a:p>
             <a:pPr lvl="2"/>
@@ -5624,11 +5663,7 @@
             </a:r>
             <a:r>
               <a:rPr lang="fr-FR" dirty="0" smtClean="0"/>
-              <a:t> </a:t>
-            </a:r>
-            <a:r>
-              <a:rPr lang="fr-FR" dirty="0" smtClean="0"/>
-              <a:t>information </a:t>
+              <a:t> information </a:t>
             </a:r>
           </a:p>
           <a:p>
@@ -5659,7 +5694,7 @@
             </a:r>
             <a:r>
               <a:rPr lang="fr-FR" dirty="0" err="1" smtClean="0"/>
-              <a:t>developpers</a:t>
+              <a:t>developers</a:t>
             </a:r>
             <a:endParaRPr lang="fr-FR" sz="1600" b="1" dirty="0" smtClean="0"/>
           </a:p>
@@ -5734,7 +5769,7 @@
         </p:blipFill>
         <p:spPr>
           <a:xfrm flipH="1">
-            <a:off x="6455023" y="4443923"/>
+            <a:off x="6194272" y="4587764"/>
             <a:ext cx="1138421" cy="1133361"/>
           </a:xfrm>
           <a:prstGeom prst="rect">
@@ -5839,9 +5874,9 @@
           </a:stretch>
         </p:blipFill>
         <p:spPr>
-          <a:xfrm rot="19875268">
-            <a:off x="7502921" y="4801628"/>
-            <a:ext cx="374378" cy="1190329"/>
+          <a:xfrm rot="18624091">
+            <a:off x="7239578" y="4789136"/>
+            <a:ext cx="439484" cy="1138953"/>
           </a:xfrm>
           <a:prstGeom prst="rect">
             <a:avLst/>
@@ -5856,7 +5891,7 @@
         </p:nvSpPr>
         <p:spPr>
           <a:xfrm>
-            <a:off x="4334294" y="5539878"/>
+            <a:off x="4334294" y="5652095"/>
             <a:ext cx="4269881" cy="646331"/>
           </a:xfrm>
           <a:prstGeom prst="rect">
@@ -6100,43 +6135,65 @@
             </a:r>
             <a:r>
               <a:rPr lang="fr-FR" sz="2600" dirty="0" smtClean="0"/>
+              <a:t> in CDS </a:t>
+            </a:r>
+            <a:r>
+              <a:rPr lang="fr-FR" sz="2600" dirty="0" err="1" smtClean="0"/>
+              <a:t>projects</a:t>
+            </a:r>
+            <a:r>
+              <a:rPr lang="fr-FR" sz="2600" dirty="0"/>
               <a:t> </a:t>
             </a:r>
             <a:r>
               <a:rPr lang="fr-FR" sz="2600" dirty="0" smtClean="0"/>
-              <a:t>in</a:t>
+              <a:t>(beta </a:t>
+            </a:r>
+            <a:r>
+              <a:rPr lang="fr-FR" sz="2600" dirty="0" err="1" smtClean="0"/>
+              <a:t>testers</a:t>
+            </a:r>
+            <a:r>
+              <a:rPr lang="fr-FR" sz="2600" dirty="0" smtClean="0"/>
+              <a:t>, use of new </a:t>
+            </a:r>
+            <a:r>
+              <a:rPr lang="fr-FR" sz="2600" dirty="0" err="1" smtClean="0"/>
+              <a:t>validated</a:t>
             </a:r>
             <a:r>
               <a:rPr lang="fr-FR" sz="2600" dirty="0" smtClean="0"/>
               <a:t> </a:t>
             </a:r>
             <a:r>
+              <a:rPr lang="fr-FR" sz="2600" dirty="0" err="1" smtClean="0"/>
+              <a:t>algorithms</a:t>
+            </a:r>
+            <a:r>
               <a:rPr lang="fr-FR" sz="2600" dirty="0" smtClean="0"/>
-              <a:t>CDS </a:t>
+              <a:t>, use of CDS </a:t>
             </a:r>
             <a:r>
               <a:rPr lang="fr-FR" sz="2600" dirty="0" err="1" smtClean="0"/>
-              <a:t>projects</a:t>
-            </a:r>
-            <a:r>
-              <a:rPr lang="fr-FR" sz="2600" dirty="0"/>
-              <a:t> </a:t>
+              <a:t>platforms</a:t>
             </a:r>
             <a:r>
               <a:rPr lang="fr-FR" sz="2600" dirty="0" smtClean="0"/>
-              <a:t>(beta </a:t>
+              <a:t>)</a:t>
+            </a:r>
+            <a:r>
+              <a:rPr lang="fr-FR" sz="2600" dirty="0" smtClean="0"/>
+              <a:t>.</a:t>
+            </a:r>
+          </a:p>
+          <a:p>
+            <a:r>
+              <a:rPr lang="fr-FR" sz="2600" dirty="0" smtClean="0"/>
+              <a:t>The CDS </a:t>
             </a:r>
             <a:r>
               <a:rPr lang="fr-FR" sz="2600" dirty="0" err="1" smtClean="0"/>
-              <a:t>testers</a:t>
-            </a:r>
-            <a:r>
-              <a:rPr lang="fr-FR" sz="2600" dirty="0" smtClean="0"/>
-              <a:t>, use of new </a:t>
-            </a:r>
-            <a:r>
-              <a:rPr lang="fr-FR" sz="2600" dirty="0" err="1" smtClean="0"/>
-              <a:t>validated</a:t>
+              <a:t>could</a:t>
             </a:r>
             <a:r>
               <a:rPr lang="fr-FR" sz="2600" dirty="0" smtClean="0"/>
@@ -6144,11 +6201,43 @@
             </a:r>
             <a:r>
               <a:rPr lang="fr-FR" sz="2600" dirty="0" err="1" smtClean="0"/>
-              <a:t>algorithms</a:t>
+              <a:t>also</a:t>
             </a:r>
             <a:r>
               <a:rPr lang="fr-FR" sz="2600" dirty="0" smtClean="0"/>
-              <a:t>).</a:t>
+              <a:t> </a:t>
+            </a:r>
+            <a:r>
+              <a:rPr lang="fr-FR" sz="2600" dirty="0" err="1" smtClean="0"/>
+              <a:t>learn</a:t>
+            </a:r>
+            <a:r>
+              <a:rPr lang="fr-FR" sz="2600" dirty="0" smtClean="0"/>
+              <a:t> </a:t>
+            </a:r>
+            <a:r>
+              <a:rPr lang="fr-FR" sz="2600" dirty="0" err="1" smtClean="0"/>
+              <a:t>from</a:t>
+            </a:r>
+            <a:r>
+              <a:rPr lang="fr-FR" sz="2600" dirty="0" smtClean="0"/>
+              <a:t> the expertise of </a:t>
+            </a:r>
+            <a:r>
+              <a:rPr lang="fr-FR" sz="2600" dirty="0" err="1" smtClean="0"/>
+              <a:t>LoOPS</a:t>
+            </a:r>
+            <a:r>
+              <a:rPr lang="fr-FR" sz="2600" dirty="0" smtClean="0"/>
+              <a:t> </a:t>
+            </a:r>
+            <a:r>
+              <a:rPr lang="fr-FR" sz="2600" dirty="0" err="1" smtClean="0"/>
+              <a:t>members</a:t>
+            </a:r>
+            <a:r>
+              <a:rPr lang="fr-FR" sz="2600" dirty="0" smtClean="0"/>
+              <a:t>.</a:t>
             </a:r>
           </a:p>
           <a:p>
@@ -6159,60 +6248,6 @@
             <a:r>
               <a:rPr lang="fr-FR" sz="2600" dirty="0" err="1" smtClean="0"/>
               <a:t>could</a:t>
-            </a:r>
-            <a:r>
-              <a:rPr lang="fr-FR" sz="2600" dirty="0" smtClean="0"/>
-              <a:t> </a:t>
-            </a:r>
-            <a:r>
-              <a:rPr lang="fr-FR" sz="2600" dirty="0" err="1" smtClean="0"/>
-              <a:t>also</a:t>
-            </a:r>
-            <a:r>
-              <a:rPr lang="fr-FR" sz="2600" dirty="0" smtClean="0"/>
-              <a:t> </a:t>
-            </a:r>
-            <a:r>
-              <a:rPr lang="fr-FR" sz="2600" dirty="0" err="1" smtClean="0"/>
-              <a:t>learn</a:t>
-            </a:r>
-            <a:r>
-              <a:rPr lang="fr-FR" sz="2600" dirty="0" smtClean="0"/>
-              <a:t> </a:t>
-            </a:r>
-            <a:r>
-              <a:rPr lang="fr-FR" sz="2600" dirty="0" err="1" smtClean="0"/>
-              <a:t>from</a:t>
-            </a:r>
-            <a:r>
-              <a:rPr lang="fr-FR" sz="2600" dirty="0" smtClean="0"/>
-              <a:t> the expertise of </a:t>
-            </a:r>
-            <a:r>
-              <a:rPr lang="fr-FR" sz="2600" dirty="0" err="1" smtClean="0"/>
-              <a:t>LoOPS</a:t>
-            </a:r>
-            <a:r>
-              <a:rPr lang="fr-FR" sz="2600" dirty="0" smtClean="0"/>
-              <a:t> </a:t>
-            </a:r>
-            <a:r>
-              <a:rPr lang="fr-FR" sz="2600" dirty="0" err="1" smtClean="0"/>
-              <a:t>members</a:t>
-            </a:r>
-            <a:r>
-              <a:rPr lang="fr-FR" sz="2600" dirty="0" smtClean="0"/>
-              <a:t>.</a:t>
-            </a:r>
-          </a:p>
-          <a:p>
-            <a:r>
-              <a:rPr lang="fr-FR" sz="2600" dirty="0" smtClean="0"/>
-              <a:t>The CDS </a:t>
-            </a:r>
-            <a:r>
-              <a:rPr lang="fr-FR" sz="2600" dirty="0" err="1" smtClean="0"/>
-              <a:t>can</a:t>
             </a:r>
             <a:r>
               <a:rPr lang="fr-FR" sz="2600" dirty="0" smtClean="0"/>
@@ -6422,7 +6457,12 @@
             <p:ph idx="1"/>
           </p:nvPr>
         </p:nvSpPr>
-        <p:spPr/>
+        <p:spPr>
+          <a:xfrm>
+            <a:off x="457200" y="1600200"/>
+            <a:ext cx="8229600" cy="2334435"/>
+          </a:xfrm>
+        </p:spPr>
         <p:txBody>
           <a:bodyPr/>
           <a:lstStyle/>
@@ -6431,50 +6471,49 @@
               <a:buNone/>
             </a:pPr>
             <a:r>
-              <a:rPr lang="fr-FR" sz="2400" dirty="0" smtClean="0"/>
+              <a:rPr lang="fr-FR" sz="2200" dirty="0" smtClean="0"/>
               <a:t>You </a:t>
             </a:r>
             <a:r>
-              <a:rPr lang="fr-FR" sz="2400" dirty="0" err="1" smtClean="0"/>
+              <a:rPr lang="fr-FR" sz="2200" dirty="0" err="1" smtClean="0"/>
               <a:t>can</a:t>
             </a:r>
             <a:r>
-              <a:rPr lang="fr-FR" sz="2400" dirty="0" smtClean="0"/>
+              <a:rPr lang="fr-FR" sz="2200" dirty="0" smtClean="0"/>
               <a:t> </a:t>
             </a:r>
             <a:r>
-              <a:rPr lang="fr-FR" sz="2400" dirty="0" err="1" smtClean="0"/>
+              <a:rPr lang="fr-FR" sz="2200" dirty="0" err="1" smtClean="0"/>
               <a:t>subscribe</a:t>
             </a:r>
             <a:r>
-              <a:rPr lang="fr-FR" sz="2400" dirty="0" smtClean="0"/>
+              <a:rPr lang="fr-FR" sz="2200" dirty="0" smtClean="0"/>
               <a:t> to the </a:t>
             </a:r>
             <a:r>
-              <a:rPr lang="fr-FR" sz="2400" dirty="0" err="1" smtClean="0"/>
+              <a:rPr lang="fr-FR" sz="2200" dirty="0" err="1" smtClean="0"/>
               <a:t>LoOPS</a:t>
             </a:r>
             <a:r>
-              <a:rPr lang="fr-FR" sz="2400" dirty="0" smtClean="0"/>
+              <a:rPr lang="fr-FR" sz="2200" dirty="0" smtClean="0"/>
               <a:t> </a:t>
             </a:r>
             <a:r>
-              <a:rPr lang="fr-FR" sz="2400" dirty="0" err="1" smtClean="0"/>
+              <a:rPr lang="fr-FR" sz="2200" dirty="0" err="1" smtClean="0"/>
               <a:t>list</a:t>
             </a:r>
             <a:r>
-              <a:rPr lang="fr-FR" sz="2400" dirty="0" smtClean="0"/>
+              <a:rPr lang="fr-FR" sz="2200" dirty="0" smtClean="0"/>
               <a:t> </a:t>
             </a:r>
             <a:r>
-              <a:rPr lang="fr-FR" sz="2400" dirty="0" err="1" smtClean="0"/>
+              <a:rPr lang="fr-FR" sz="2200" dirty="0" err="1" smtClean="0"/>
               <a:t>at</a:t>
             </a:r>
             <a:r>
-              <a:rPr lang="fr-FR" sz="2400" dirty="0" smtClean="0"/>
+              <a:rPr lang="fr-FR" sz="2200" dirty="0" smtClean="0"/>
               <a:t>:</a:t>
             </a:r>
-            <a:endParaRPr lang="fr-FR" sz="2400" dirty="0" smtClean="0"/>
           </a:p>
           <a:p>
             <a:pPr marL="0" indent="0">
@@ -6530,63 +6569,99 @@
               <a:buNone/>
             </a:pPr>
             <a:r>
-              <a:rPr lang="fr-FR" sz="2400" dirty="0" smtClean="0"/>
+              <a:rPr lang="fr-FR" sz="2200" dirty="0" smtClean="0"/>
               <a:t>7</a:t>
             </a:r>
             <a:r>
-              <a:rPr lang="fr-FR" sz="2400" baseline="30000" dirty="0" smtClean="0"/>
+              <a:rPr lang="fr-FR" sz="2200" baseline="30000" dirty="0" smtClean="0"/>
               <a:t>th</a:t>
             </a:r>
             <a:r>
-              <a:rPr lang="fr-FR" sz="2400" dirty="0" smtClean="0"/>
+              <a:rPr lang="fr-FR" sz="2200" dirty="0" smtClean="0"/>
               <a:t> </a:t>
             </a:r>
             <a:r>
-              <a:rPr lang="fr-FR" sz="2400" dirty="0" err="1" smtClean="0"/>
+              <a:rPr lang="fr-FR" sz="2200" dirty="0" err="1" smtClean="0"/>
               <a:t>LoOPS</a:t>
             </a:r>
             <a:r>
-              <a:rPr lang="fr-FR" sz="2400" dirty="0" smtClean="0"/>
+              <a:rPr lang="fr-FR" sz="2200" dirty="0" smtClean="0"/>
               <a:t> </a:t>
             </a:r>
             <a:r>
-              <a:rPr lang="fr-FR" sz="2400" dirty="0" err="1" smtClean="0"/>
+              <a:rPr lang="fr-FR" sz="2200" dirty="0" err="1" smtClean="0"/>
               <a:t>day</a:t>
             </a:r>
             <a:r>
-              <a:rPr lang="fr-FR" sz="2400" dirty="0" smtClean="0"/>
+              <a:rPr lang="fr-FR" sz="2200" dirty="0" smtClean="0"/>
               <a:t> on </a:t>
             </a:r>
             <a:r>
-              <a:rPr lang="fr-FR" sz="2400" dirty="0" err="1" smtClean="0"/>
+              <a:rPr lang="fr-FR" sz="2200" dirty="0" err="1" smtClean="0"/>
               <a:t>november</a:t>
             </a:r>
             <a:r>
-              <a:rPr lang="fr-FR" sz="2400" dirty="0" smtClean="0"/>
-              <a:t> 17th on software licences and </a:t>
-            </a:r>
-            <a:r>
-              <a:rPr lang="fr-FR" sz="2400" dirty="0" err="1" smtClean="0"/>
+              <a:rPr lang="fr-FR" sz="2200" dirty="0" smtClean="0"/>
+              <a:t> 17th on </a:t>
+            </a:r>
+            <a:r>
+              <a:rPr lang="fr-FR" sz="2200" b="1" dirty="0">
+                <a:solidFill>
+                  <a:srgbClr val="FF0000"/>
+                </a:solidFill>
+              </a:rPr>
+              <a:t>S</a:t>
+            </a:r>
+            <a:r>
+              <a:rPr lang="fr-FR" sz="2200" b="1" dirty="0" smtClean="0">
+                <a:solidFill>
+                  <a:srgbClr val="FF0000"/>
+                </a:solidFill>
+              </a:rPr>
+              <a:t>oftware </a:t>
+            </a:r>
+            <a:r>
+              <a:rPr lang="fr-FR" sz="2200" b="1" dirty="0" smtClean="0">
+                <a:solidFill>
+                  <a:srgbClr val="FF0000"/>
+                </a:solidFill>
+              </a:rPr>
+              <a:t>licences and </a:t>
+            </a:r>
+            <a:r>
+              <a:rPr lang="fr-FR" sz="2200" b="1" dirty="0" err="1" smtClean="0">
+                <a:solidFill>
+                  <a:srgbClr val="FF0000"/>
+                </a:solidFill>
+              </a:rPr>
               <a:t>intellectual</a:t>
             </a:r>
             <a:r>
-              <a:rPr lang="fr-FR" sz="2400" dirty="0" smtClean="0"/>
+              <a:rPr lang="fr-FR" sz="2200" b="1" dirty="0" smtClean="0">
+                <a:solidFill>
+                  <a:srgbClr val="FF0000"/>
+                </a:solidFill>
+              </a:rPr>
               <a:t> </a:t>
             </a:r>
             <a:r>
-              <a:rPr lang="fr-FR" sz="2400" dirty="0" err="1" smtClean="0"/>
+              <a:rPr lang="fr-FR" sz="2200" b="1" dirty="0" err="1" smtClean="0">
+                <a:solidFill>
+                  <a:srgbClr val="FF0000"/>
+                </a:solidFill>
+              </a:rPr>
               <a:t>property</a:t>
             </a:r>
             <a:r>
-              <a:rPr lang="fr-FR" sz="2400" dirty="0" smtClean="0"/>
+              <a:rPr lang="fr-FR" sz="2200" dirty="0" smtClean="0"/>
               <a:t>. </a:t>
             </a:r>
             <a:r>
-              <a:rPr lang="fr-FR" sz="2400" dirty="0" err="1" smtClean="0"/>
+              <a:rPr lang="fr-FR" sz="2200" dirty="0" err="1" smtClean="0"/>
               <a:t>Digiteo</a:t>
             </a:r>
             <a:r>
-              <a:rPr lang="fr-FR" sz="2400" dirty="0" smtClean="0"/>
+              <a:rPr lang="fr-FR" sz="2200" dirty="0" smtClean="0"/>
               <a:t> Bât 660</a:t>
             </a:r>
           </a:p>
@@ -6594,82 +6669,102 @@
             <a:pPr marL="0" indent="0">
               <a:buNone/>
             </a:pPr>
-            <a:endParaRPr lang="fr-FR" sz="2400" dirty="0" smtClean="0"/>
+            <a:endParaRPr lang="fr-FR" sz="2200" dirty="0" smtClean="0"/>
           </a:p>
           <a:p>
             <a:pPr marL="0" indent="0">
               <a:buNone/>
             </a:pPr>
             <a:r>
-              <a:rPr lang="fr-FR" sz="2400" dirty="0" smtClean="0"/>
+              <a:rPr lang="fr-FR" sz="2200" dirty="0" smtClean="0"/>
               <a:t>8</a:t>
             </a:r>
             <a:r>
-              <a:rPr lang="fr-FR" sz="2400" baseline="30000" dirty="0" smtClean="0"/>
+              <a:rPr lang="fr-FR" sz="2200" baseline="30000" dirty="0" smtClean="0"/>
               <a:t>th</a:t>
             </a:r>
             <a:r>
-              <a:rPr lang="fr-FR" sz="2400" dirty="0" smtClean="0"/>
+              <a:rPr lang="fr-FR" sz="2200" dirty="0" smtClean="0"/>
               <a:t> </a:t>
             </a:r>
             <a:r>
-              <a:rPr lang="fr-FR" sz="2400" dirty="0" err="1" smtClean="0"/>
+              <a:rPr lang="fr-FR" sz="2200" dirty="0" err="1" smtClean="0"/>
               <a:t>LoOPS</a:t>
             </a:r>
             <a:r>
-              <a:rPr lang="fr-FR" sz="2400" dirty="0" smtClean="0"/>
+              <a:rPr lang="fr-FR" sz="2200" dirty="0" smtClean="0"/>
               <a:t> </a:t>
             </a:r>
             <a:r>
-              <a:rPr lang="fr-FR" sz="2400" dirty="0" err="1" smtClean="0"/>
+              <a:rPr lang="fr-FR" sz="2200" dirty="0" err="1" smtClean="0"/>
               <a:t>day</a:t>
             </a:r>
             <a:r>
-              <a:rPr lang="fr-FR" sz="2400" dirty="0" smtClean="0"/>
+              <a:rPr lang="fr-FR" sz="2200" dirty="0" smtClean="0"/>
               <a:t> on </a:t>
             </a:r>
             <a:r>
-              <a:rPr lang="fr-FR" sz="2400" dirty="0" err="1" smtClean="0"/>
+              <a:rPr lang="fr-FR" sz="2200" dirty="0" err="1" smtClean="0"/>
               <a:t>december</a:t>
             </a:r>
             <a:r>
-              <a:rPr lang="fr-FR" sz="2400" dirty="0" smtClean="0"/>
-              <a:t> 17th (Proto 204) on Docker and </a:t>
-            </a:r>
-            <a:r>
-              <a:rPr lang="fr-FR" sz="2400" dirty="0" err="1" smtClean="0"/>
+              <a:rPr lang="fr-FR" sz="2200" dirty="0" smtClean="0"/>
+              <a:t> 17th </a:t>
+            </a:r>
+            <a:r>
+              <a:rPr lang="fr-FR" sz="2200" dirty="0" smtClean="0"/>
+              <a:t>on </a:t>
+            </a:r>
+            <a:r>
+              <a:rPr lang="fr-FR" sz="2200" b="1" dirty="0" smtClean="0">
+                <a:solidFill>
+                  <a:srgbClr val="FF0000"/>
+                </a:solidFill>
+              </a:rPr>
+              <a:t>Docker and </a:t>
+            </a:r>
+            <a:r>
+              <a:rPr lang="fr-FR" sz="2200" b="1" dirty="0" err="1" smtClean="0">
+                <a:solidFill>
+                  <a:srgbClr val="FF0000"/>
+                </a:solidFill>
+              </a:rPr>
               <a:t>Unikernel</a:t>
             </a:r>
-            <a:endParaRPr lang="fr-FR" sz="2400" dirty="0" smtClean="0"/>
+            <a:r>
+              <a:rPr lang="fr-FR" sz="2200" dirty="0" smtClean="0"/>
+              <a:t>. Proto 204</a:t>
+            </a:r>
+            <a:endParaRPr lang="fr-FR" sz="2200" dirty="0"/>
           </a:p>
           <a:p>
             <a:pPr marL="0" indent="0">
               <a:buNone/>
             </a:pPr>
-            <a:endParaRPr lang="fr-FR" sz="2400" dirty="0"/>
+            <a:endParaRPr lang="fr-FR" sz="2200" dirty="0" smtClean="0"/>
           </a:p>
           <a:p>
             <a:pPr marL="0" indent="0">
               <a:buNone/>
             </a:pPr>
             <a:r>
-              <a:rPr lang="fr-FR" sz="2400" dirty="0" smtClean="0"/>
+              <a:rPr lang="fr-FR" sz="2200" dirty="0" smtClean="0"/>
               <a:t>GPU </a:t>
             </a:r>
             <a:r>
-              <a:rPr lang="fr-FR" sz="2400" dirty="0" err="1" smtClean="0"/>
+              <a:rPr lang="fr-FR" sz="2200" dirty="0" err="1" smtClean="0"/>
               <a:t>day</a:t>
             </a:r>
             <a:r>
-              <a:rPr lang="fr-FR" sz="2400" dirty="0" smtClean="0"/>
+              <a:rPr lang="fr-FR" sz="2200" dirty="0" smtClean="0"/>
               <a:t> in 2016 (first </a:t>
             </a:r>
             <a:r>
-              <a:rPr lang="fr-FR" sz="2400" dirty="0" err="1" smtClean="0"/>
+              <a:rPr lang="fr-FR" sz="2200" dirty="0" err="1" smtClean="0"/>
               <a:t>semester</a:t>
             </a:r>
             <a:r>
-              <a:rPr lang="fr-FR" sz="2400" dirty="0" smtClean="0"/>
+              <a:rPr lang="fr-FR" sz="2200" dirty="0" smtClean="0"/>
               <a:t>)</a:t>
             </a:r>
           </a:p>
@@ -6721,7 +6816,6 @@
           <a:bodyPr rtlCol="0" anchor="ctr"/>
           <a:lstStyle/>
           <a:p>
-            <a:pPr algn="ctr"/>
             <a:r>
               <a:rPr lang="fr-FR" dirty="0" smtClean="0"/>
               <a:t>Net </a:t>
@@ -6782,10 +6876,10 @@
           <a:lstStyle/>
           <a:p>
             <a:r>
-              <a:rPr lang="fr-FR" smtClean="0"/>
+              <a:rPr lang="fr-FR" dirty="0" smtClean="0"/>
               <a:t>CDS Open Software Initiative</a:t>
             </a:r>
-            <a:endParaRPr lang="fr-FR"/>
+            <a:endParaRPr lang="fr-FR" dirty="0"/>
           </a:p>
         </p:txBody>
       </p:sp>
@@ -6829,7 +6923,6 @@
           <a:bodyPr rtlCol="0" anchor="ctr"/>
           <a:lstStyle/>
           <a:p>
-            <a:pPr algn="ctr"/>
             <a:r>
               <a:rPr lang="fr-FR" dirty="0" smtClean="0"/>
               <a:t># </a:t>
@@ -6892,10 +6985,82 @@
           </a:p>
         </p:txBody>
       </p:sp>
+      <p:sp>
+        <p:nvSpPr>
+          <p:cNvPr id="10" name="Rectangle 9"/>
+          <p:cNvSpPr/>
+          <p:nvPr/>
+        </p:nvSpPr>
+        <p:spPr>
+          <a:xfrm>
+            <a:off x="0" y="5945544"/>
+            <a:ext cx="4044827" cy="322262"/>
+          </a:xfrm>
+          <a:prstGeom prst="rect">
+            <a:avLst/>
+          </a:prstGeom>
+          <a:solidFill>
+            <a:schemeClr val="tx1"/>
+          </a:solidFill>
+          <a:ln>
+            <a:noFill/>
+          </a:ln>
+          <a:effectLst/>
+        </p:spPr>
+        <p:style>
+          <a:lnRef idx="1">
+            <a:schemeClr val="accent1"/>
+          </a:lnRef>
+          <a:fillRef idx="3">
+            <a:schemeClr val="accent1"/>
+          </a:fillRef>
+          <a:effectRef idx="2">
+            <a:schemeClr val="accent1"/>
+          </a:effectRef>
+          <a:fontRef idx="minor">
+            <a:schemeClr val="lt1"/>
+          </a:fontRef>
+        </p:style>
+        <p:txBody>
+          <a:bodyPr rtlCol="0" anchor="ctr"/>
+          <a:lstStyle/>
+          <a:p>
+            <a:r>
+              <a:rPr lang="fr-FR" dirty="0" smtClean="0"/>
+              <a:t># </a:t>
+            </a:r>
+            <a:r>
+              <a:rPr lang="fr-FR" dirty="0" err="1" smtClean="0"/>
+              <a:t>echo</a:t>
+            </a:r>
+            <a:r>
+              <a:rPr lang="fr-FR" dirty="0"/>
+              <a:t> </a:t>
+            </a:r>
+            <a:r>
+              <a:rPr lang="fr-FR" dirty="0" smtClean="0"/>
+              <a:t>THANK YOU for </a:t>
+            </a:r>
+            <a:r>
+              <a:rPr lang="fr-FR" dirty="0" err="1" smtClean="0"/>
+              <a:t>your</a:t>
+            </a:r>
+            <a:r>
+              <a:rPr lang="fr-FR" dirty="0" smtClean="0"/>
+              <a:t> attention </a:t>
+            </a:r>
+            <a:endParaRPr lang="fr-FR" dirty="0">
+              <a:solidFill>
+                <a:srgbClr val="63F8FF"/>
+              </a:solidFill>
+            </a:endParaRPr>
+          </a:p>
+        </p:txBody>
+      </p:sp>
     </p:spTree>
     <p:extLst>
       <p:ext uri="{BB962C8B-B14F-4D97-AF65-F5344CB8AC3E}">
-        <p14:creationId xmlns:p14="http://schemas.microsoft.com/office/powerpoint/2010/main" val="211081579"/>
+        <p14:creationId xmlns:p14="http://schemas.microsoft.com/office/powerpoint/2010/main" val="1234778110"/>
       </p:ext>
     </p:extLst>
   </p:cSld>

</xml_diff>